<commit_message>
Working on version 0.3
</commit_message>
<xml_diff>
--- a/nonUnity_folder/logo.pptx
+++ b/nonUnity_folder/logo.pptx
@@ -104,6 +104,11 @@
       </a:defRPr>
     </a:lvl9pPr>
   </p:defaultTextStyle>
+  <p:extLst>
+    <p:ext uri="{EFAFB233-063F-42B5-8137-9DF3F51BA10A}">
+      <p15:sldGuideLst xmlns:p15="http://schemas.microsoft.com/office/powerpoint/2012/main"/>
+    </p:ext>
+  </p:extLst>
 </p:presentation>
 </file>
 
@@ -256,7 +261,7 @@
           <a:p>
             <a:fld id="{3C8759A3-4040-495F-887C-BA25492BA894}" type="datetimeFigureOut">
               <a:rPr lang="en-GB" smtClean="0"/>
-              <a:t>25/03/2022</a:t>
+              <a:t>11/04/2022</a:t>
             </a:fld>
             <a:endParaRPr lang="en-GB"/>
           </a:p>
@@ -456,7 +461,7 @@
           <a:p>
             <a:fld id="{3C8759A3-4040-495F-887C-BA25492BA894}" type="datetimeFigureOut">
               <a:rPr lang="en-GB" smtClean="0"/>
-              <a:t>25/03/2022</a:t>
+              <a:t>11/04/2022</a:t>
             </a:fld>
             <a:endParaRPr lang="en-GB"/>
           </a:p>
@@ -666,7 +671,7 @@
           <a:p>
             <a:fld id="{3C8759A3-4040-495F-887C-BA25492BA894}" type="datetimeFigureOut">
               <a:rPr lang="en-GB" smtClean="0"/>
-              <a:t>25/03/2022</a:t>
+              <a:t>11/04/2022</a:t>
             </a:fld>
             <a:endParaRPr lang="en-GB"/>
           </a:p>
@@ -866,7 +871,7 @@
           <a:p>
             <a:fld id="{3C8759A3-4040-495F-887C-BA25492BA894}" type="datetimeFigureOut">
               <a:rPr lang="en-GB" smtClean="0"/>
-              <a:t>25/03/2022</a:t>
+              <a:t>11/04/2022</a:t>
             </a:fld>
             <a:endParaRPr lang="en-GB"/>
           </a:p>
@@ -1142,7 +1147,7 @@
           <a:p>
             <a:fld id="{3C8759A3-4040-495F-887C-BA25492BA894}" type="datetimeFigureOut">
               <a:rPr lang="en-GB" smtClean="0"/>
-              <a:t>25/03/2022</a:t>
+              <a:t>11/04/2022</a:t>
             </a:fld>
             <a:endParaRPr lang="en-GB"/>
           </a:p>
@@ -1410,7 +1415,7 @@
           <a:p>
             <a:fld id="{3C8759A3-4040-495F-887C-BA25492BA894}" type="datetimeFigureOut">
               <a:rPr lang="en-GB" smtClean="0"/>
-              <a:t>25/03/2022</a:t>
+              <a:t>11/04/2022</a:t>
             </a:fld>
             <a:endParaRPr lang="en-GB"/>
           </a:p>
@@ -1825,7 +1830,7 @@
           <a:p>
             <a:fld id="{3C8759A3-4040-495F-887C-BA25492BA894}" type="datetimeFigureOut">
               <a:rPr lang="en-GB" smtClean="0"/>
-              <a:t>25/03/2022</a:t>
+              <a:t>11/04/2022</a:t>
             </a:fld>
             <a:endParaRPr lang="en-GB"/>
           </a:p>
@@ -1967,7 +1972,7 @@
           <a:p>
             <a:fld id="{3C8759A3-4040-495F-887C-BA25492BA894}" type="datetimeFigureOut">
               <a:rPr lang="en-GB" smtClean="0"/>
-              <a:t>25/03/2022</a:t>
+              <a:t>11/04/2022</a:t>
             </a:fld>
             <a:endParaRPr lang="en-GB"/>
           </a:p>
@@ -2080,7 +2085,7 @@
           <a:p>
             <a:fld id="{3C8759A3-4040-495F-887C-BA25492BA894}" type="datetimeFigureOut">
               <a:rPr lang="en-GB" smtClean="0"/>
-              <a:t>25/03/2022</a:t>
+              <a:t>11/04/2022</a:t>
             </a:fld>
             <a:endParaRPr lang="en-GB"/>
           </a:p>
@@ -2393,7 +2398,7 @@
           <a:p>
             <a:fld id="{3C8759A3-4040-495F-887C-BA25492BA894}" type="datetimeFigureOut">
               <a:rPr lang="en-GB" smtClean="0"/>
-              <a:t>25/03/2022</a:t>
+              <a:t>11/04/2022</a:t>
             </a:fld>
             <a:endParaRPr lang="en-GB"/>
           </a:p>
@@ -2682,7 +2687,7 @@
           <a:p>
             <a:fld id="{3C8759A3-4040-495F-887C-BA25492BA894}" type="datetimeFigureOut">
               <a:rPr lang="en-GB" smtClean="0"/>
-              <a:t>25/03/2022</a:t>
+              <a:t>11/04/2022</a:t>
             </a:fld>
             <a:endParaRPr lang="en-GB"/>
           </a:p>
@@ -2925,7 +2930,7 @@
           <a:p>
             <a:fld id="{3C8759A3-4040-495F-887C-BA25492BA894}" type="datetimeFigureOut">
               <a:rPr lang="en-GB" smtClean="0"/>
-              <a:t>25/03/2022</a:t>
+              <a:t>11/04/2022</a:t>
             </a:fld>
             <a:endParaRPr lang="en-GB"/>
           </a:p>
@@ -3658,8 +3663,8 @@
         </p:nvSpPr>
         <p:spPr>
           <a:xfrm>
-            <a:off x="5174355" y="2790447"/>
-            <a:ext cx="1957588" cy="1200329"/>
+            <a:off x="5167142" y="2790447"/>
+            <a:ext cx="1972015" cy="1200329"/>
           </a:xfrm>
           <a:prstGeom prst="rect">
             <a:avLst/>
@@ -3681,7 +3686,42 @@
                   </a:schemeClr>
                 </a:solidFill>
               </a:rPr>
-              <a:t>AMT</a:t>
+              <a:t>OLM</a:t>
+            </a:r>
+          </a:p>
+        </p:txBody>
+      </p:sp>
+      <p:sp>
+        <p:nvSpPr>
+          <p:cNvPr id="2" name="TextBox 1">
+            <a:extLst>
+              <a:ext uri="{FF2B5EF4-FFF2-40B4-BE49-F238E27FC236}">
+                <a16:creationId xmlns:a16="http://schemas.microsoft.com/office/drawing/2014/main" id="{6974E0F5-1173-41A6-8F39-BDC01EE533BA}"/>
+              </a:ext>
+            </a:extLst>
+          </p:cNvPr>
+          <p:cNvSpPr txBox="1"/>
+          <p:nvPr/>
+        </p:nvSpPr>
+        <p:spPr>
+          <a:xfrm>
+            <a:off x="5490371" y="3451270"/>
+            <a:ext cx="1325556" cy="923330"/>
+          </a:xfrm>
+          <a:prstGeom prst="rect">
+            <a:avLst/>
+          </a:prstGeom>
+          <a:noFill/>
+        </p:spPr>
+        <p:txBody>
+          <a:bodyPr wrap="none" rtlCol="0">
+            <a:spAutoFit/>
+          </a:bodyPr>
+          <a:lstStyle/>
+          <a:p>
+            <a:r>
+              <a:rPr lang="en-GB" sz="5400" dirty="0"/>
+              <a:t>task</a:t>
             </a:r>
           </a:p>
         </p:txBody>

</xml_diff>